<commit_message>
make_scatter2() renamed to make_scatter_with_size_adjustment().  make_scatter() and make_scatter_with_size_adjustment() now return fig, ax objects.  Adjusted first three scatter plots to show outlier Willow Tv and its x/y coordinates on x or y-axis for reference
</commit_message>
<xml_diff>
--- a/companyxyz_presentationNEW.pptx
+++ b/companyxyz_presentationNEW.pptx
@@ -5092,10 +5092,10 @@
       </p:sp>
       <p:pic>
         <p:nvPicPr>
-          <p:cNvPr id="5" name="Picture 4">
-            <a:extLst>
-              <a:ext uri="{FF2B5EF4-FFF2-40B4-BE49-F238E27FC236}">
-                <a16:creationId xmlns:a16="http://schemas.microsoft.com/office/drawing/2014/main" id="{7E4AC08E-410A-BD4D-85CB-D666FA54BDCB}"/>
+          <p:cNvPr id="4" name="Picture 3">
+            <a:extLst>
+              <a:ext uri="{FF2B5EF4-FFF2-40B4-BE49-F238E27FC236}">
+                <a16:creationId xmlns:a16="http://schemas.microsoft.com/office/drawing/2014/main" id="{4322C0B3-8B3A-D84A-A119-CCC342C85BD6}"/>
               </a:ext>
             </a:extLst>
           </p:cNvPr>
@@ -5112,7 +5112,7 @@
         </p:blipFill>
         <p:spPr>
           <a:xfrm>
-            <a:off x="0" y="1352549"/>
+            <a:off x="0" y="1617280"/>
             <a:ext cx="8394700" cy="4152900"/>
           </a:xfrm>
           <a:prstGeom prst="rect">
@@ -5185,12 +5185,312 @@
           </a:p>
         </p:txBody>
       </p:sp>
+      <p:sp>
+        <p:nvSpPr>
+          <p:cNvPr id="8" name="TextBox 7">
+            <a:extLst>
+              <a:ext uri="{FF2B5EF4-FFF2-40B4-BE49-F238E27FC236}">
+                <a16:creationId xmlns:a16="http://schemas.microsoft.com/office/drawing/2014/main" id="{C007679F-A092-FD40-A2A5-5E16866D5F92}"/>
+              </a:ext>
+            </a:extLst>
+          </p:cNvPr>
+          <p:cNvSpPr txBox="1"/>
+          <p:nvPr/>
+        </p:nvSpPr>
+        <p:spPr>
+          <a:xfrm>
+            <a:off x="0" y="6488668"/>
+            <a:ext cx="10105202" cy="369332"/>
+          </a:xfrm>
+          <a:prstGeom prst="rect">
+            <a:avLst/>
+          </a:prstGeom>
+          <a:noFill/>
+        </p:spPr>
+        <p:txBody>
+          <a:bodyPr wrap="none" rtlCol="0">
+            <a:spAutoFit/>
+          </a:bodyPr>
+          <a:lstStyle/>
+          <a:p>
+            <a:r>
+              <a:rPr lang="en-US" dirty="0"/>
+              <a:t>Note: the graph is divided into four quadrants, sectioned off by Average Lift (x) and Average Purchases (y)</a:t>
+            </a:r>
+          </a:p>
+        </p:txBody>
+      </p:sp>
+      <p:sp>
+        <p:nvSpPr>
+          <p:cNvPr id="9" name="Content Placeholder 2">
+            <a:extLst>
+              <a:ext uri="{FF2B5EF4-FFF2-40B4-BE49-F238E27FC236}">
+                <a16:creationId xmlns:a16="http://schemas.microsoft.com/office/drawing/2014/main" id="{EAC6F2EE-E8AF-4644-B28C-7A46F8948265}"/>
+              </a:ext>
+            </a:extLst>
+          </p:cNvPr>
+          <p:cNvSpPr txBox="1">
+            <a:spLocks/>
+          </p:cNvSpPr>
+          <p:nvPr/>
+        </p:nvSpPr>
+        <p:spPr>
+          <a:xfrm>
+            <a:off x="8394700" y="1562421"/>
+            <a:ext cx="3429438" cy="3733158"/>
+          </a:xfrm>
+          <a:prstGeom prst="rect">
+            <a:avLst/>
+          </a:prstGeom>
+        </p:spPr>
+        <p:txBody>
+          <a:bodyPr vert="horz" lIns="91440" tIns="45720" rIns="91440" bIns="45720" rtlCol="0">
+            <a:noAutofit/>
+          </a:bodyPr>
+          <a:lstStyle>
+            <a:lvl1pPr marL="228600" indent="-228600" algn="l" defTabSz="914400" rtl="0" eaLnBrk="1" latinLnBrk="0" hangingPunct="1">
+              <a:lnSpc>
+                <a:spcPct val="90000"/>
+              </a:lnSpc>
+              <a:spcBef>
+                <a:spcPts val="1000"/>
+              </a:spcBef>
+              <a:buFont typeface="Arial" panose="020B0604020202020204" pitchFamily="34" charset="0"/>
+              <a:buChar char="•"/>
+              <a:defRPr sz="2800" kern="1200">
+                <a:solidFill>
+                  <a:schemeClr val="tx1"/>
+                </a:solidFill>
+                <a:latin typeface="+mn-lt"/>
+                <a:ea typeface="+mn-ea"/>
+                <a:cs typeface="+mn-cs"/>
+              </a:defRPr>
+            </a:lvl1pPr>
+            <a:lvl2pPr marL="685800" indent="-228600" algn="l" defTabSz="914400" rtl="0" eaLnBrk="1" latinLnBrk="0" hangingPunct="1">
+              <a:lnSpc>
+                <a:spcPct val="90000"/>
+              </a:lnSpc>
+              <a:spcBef>
+                <a:spcPts val="500"/>
+              </a:spcBef>
+              <a:buFont typeface="Arial" panose="020B0604020202020204" pitchFamily="34" charset="0"/>
+              <a:buChar char="•"/>
+              <a:defRPr sz="2400" kern="1200">
+                <a:solidFill>
+                  <a:schemeClr val="tx1"/>
+                </a:solidFill>
+                <a:latin typeface="+mn-lt"/>
+                <a:ea typeface="+mn-ea"/>
+                <a:cs typeface="+mn-cs"/>
+              </a:defRPr>
+            </a:lvl2pPr>
+            <a:lvl3pPr marL="1143000" indent="-228600" algn="l" defTabSz="914400" rtl="0" eaLnBrk="1" latinLnBrk="0" hangingPunct="1">
+              <a:lnSpc>
+                <a:spcPct val="90000"/>
+              </a:lnSpc>
+              <a:spcBef>
+                <a:spcPts val="500"/>
+              </a:spcBef>
+              <a:buFont typeface="Arial" panose="020B0604020202020204" pitchFamily="34" charset="0"/>
+              <a:buChar char="•"/>
+              <a:defRPr sz="2000" kern="1200">
+                <a:solidFill>
+                  <a:schemeClr val="tx1"/>
+                </a:solidFill>
+                <a:latin typeface="+mn-lt"/>
+                <a:ea typeface="+mn-ea"/>
+                <a:cs typeface="+mn-cs"/>
+              </a:defRPr>
+            </a:lvl3pPr>
+            <a:lvl4pPr marL="1600200" indent="-228600" algn="l" defTabSz="914400" rtl="0" eaLnBrk="1" latinLnBrk="0" hangingPunct="1">
+              <a:lnSpc>
+                <a:spcPct val="90000"/>
+              </a:lnSpc>
+              <a:spcBef>
+                <a:spcPts val="500"/>
+              </a:spcBef>
+              <a:buFont typeface="Arial" panose="020B0604020202020204" pitchFamily="34" charset="0"/>
+              <a:buChar char="•"/>
+              <a:defRPr sz="1800" kern="1200">
+                <a:solidFill>
+                  <a:schemeClr val="tx1"/>
+                </a:solidFill>
+                <a:latin typeface="+mn-lt"/>
+                <a:ea typeface="+mn-ea"/>
+                <a:cs typeface="+mn-cs"/>
+              </a:defRPr>
+            </a:lvl4pPr>
+            <a:lvl5pPr marL="2057400" indent="-228600" algn="l" defTabSz="914400" rtl="0" eaLnBrk="1" latinLnBrk="0" hangingPunct="1">
+              <a:lnSpc>
+                <a:spcPct val="90000"/>
+              </a:lnSpc>
+              <a:spcBef>
+                <a:spcPts val="500"/>
+              </a:spcBef>
+              <a:buFont typeface="Arial" panose="020B0604020202020204" pitchFamily="34" charset="0"/>
+              <a:buChar char="•"/>
+              <a:defRPr sz="1800" kern="1200">
+                <a:solidFill>
+                  <a:schemeClr val="tx1"/>
+                </a:solidFill>
+                <a:latin typeface="+mn-lt"/>
+                <a:ea typeface="+mn-ea"/>
+                <a:cs typeface="+mn-cs"/>
+              </a:defRPr>
+            </a:lvl5pPr>
+            <a:lvl6pPr marL="2514600" indent="-228600" algn="l" defTabSz="914400" rtl="0" eaLnBrk="1" latinLnBrk="0" hangingPunct="1">
+              <a:lnSpc>
+                <a:spcPct val="90000"/>
+              </a:lnSpc>
+              <a:spcBef>
+                <a:spcPts val="500"/>
+              </a:spcBef>
+              <a:buFont typeface="Arial" panose="020B0604020202020204" pitchFamily="34" charset="0"/>
+              <a:buChar char="•"/>
+              <a:defRPr sz="1800" kern="1200">
+                <a:solidFill>
+                  <a:schemeClr val="tx1"/>
+                </a:solidFill>
+                <a:latin typeface="+mn-lt"/>
+                <a:ea typeface="+mn-ea"/>
+                <a:cs typeface="+mn-cs"/>
+              </a:defRPr>
+            </a:lvl6pPr>
+            <a:lvl7pPr marL="2971800" indent="-228600" algn="l" defTabSz="914400" rtl="0" eaLnBrk="1" latinLnBrk="0" hangingPunct="1">
+              <a:lnSpc>
+                <a:spcPct val="90000"/>
+              </a:lnSpc>
+              <a:spcBef>
+                <a:spcPts val="500"/>
+              </a:spcBef>
+              <a:buFont typeface="Arial" panose="020B0604020202020204" pitchFamily="34" charset="0"/>
+              <a:buChar char="•"/>
+              <a:defRPr sz="1800" kern="1200">
+                <a:solidFill>
+                  <a:schemeClr val="tx1"/>
+                </a:solidFill>
+                <a:latin typeface="+mn-lt"/>
+                <a:ea typeface="+mn-ea"/>
+                <a:cs typeface="+mn-cs"/>
+              </a:defRPr>
+            </a:lvl7pPr>
+            <a:lvl8pPr marL="3429000" indent="-228600" algn="l" defTabSz="914400" rtl="0" eaLnBrk="1" latinLnBrk="0" hangingPunct="1">
+              <a:lnSpc>
+                <a:spcPct val="90000"/>
+              </a:lnSpc>
+              <a:spcBef>
+                <a:spcPts val="500"/>
+              </a:spcBef>
+              <a:buFont typeface="Arial" panose="020B0604020202020204" pitchFamily="34" charset="0"/>
+              <a:buChar char="•"/>
+              <a:defRPr sz="1800" kern="1200">
+                <a:solidFill>
+                  <a:schemeClr val="tx1"/>
+                </a:solidFill>
+                <a:latin typeface="+mn-lt"/>
+                <a:ea typeface="+mn-ea"/>
+                <a:cs typeface="+mn-cs"/>
+              </a:defRPr>
+            </a:lvl8pPr>
+            <a:lvl9pPr marL="3886200" indent="-228600" algn="l" defTabSz="914400" rtl="0" eaLnBrk="1" latinLnBrk="0" hangingPunct="1">
+              <a:lnSpc>
+                <a:spcPct val="90000"/>
+              </a:lnSpc>
+              <a:spcBef>
+                <a:spcPts val="500"/>
+              </a:spcBef>
+              <a:buFont typeface="Arial" panose="020B0604020202020204" pitchFamily="34" charset="0"/>
+              <a:buChar char="•"/>
+              <a:defRPr sz="1800" kern="1200">
+                <a:solidFill>
+                  <a:schemeClr val="tx1"/>
+                </a:solidFill>
+                <a:latin typeface="+mn-lt"/>
+                <a:ea typeface="+mn-ea"/>
+                <a:cs typeface="+mn-cs"/>
+              </a:defRPr>
+            </a:lvl9pPr>
+          </a:lstStyle>
+          <a:p>
+            <a:pPr marL="0" indent="0">
+              <a:buNone/>
+            </a:pPr>
+            <a:r>
+              <a:rPr lang="en-US" sz="1900" dirty="0">
+                <a:solidFill>
+                  <a:srgbClr val="00B050"/>
+                </a:solidFill>
+              </a:rPr>
+              <a:t>Below average lift, yet above average purchases: </a:t>
+            </a:r>
+          </a:p>
+          <a:p>
+            <a:pPr marL="0" indent="0">
+              <a:buNone/>
+            </a:pPr>
+            <a:r>
+              <a:rPr lang="en-US" sz="1900" dirty="0">
+                <a:solidFill>
+                  <a:srgbClr val="00B050"/>
+                </a:solidFill>
+              </a:rPr>
+              <a:t>You’re getting less lift, but more purchases despite it, that’s good!</a:t>
+            </a:r>
+          </a:p>
+          <a:p>
+            <a:pPr marL="0" indent="0">
+              <a:buNone/>
+            </a:pPr>
+            <a:endParaRPr lang="en-US" sz="1900" dirty="0">
+              <a:solidFill>
+                <a:srgbClr val="FF0000"/>
+              </a:solidFill>
+            </a:endParaRPr>
+          </a:p>
+          <a:p>
+            <a:pPr marL="0" indent="0">
+              <a:buNone/>
+            </a:pPr>
+            <a:endParaRPr lang="en-US" sz="1900" dirty="0">
+              <a:solidFill>
+                <a:srgbClr val="FF0000"/>
+              </a:solidFill>
+            </a:endParaRPr>
+          </a:p>
+          <a:p>
+            <a:pPr marL="0" indent="0">
+              <a:buNone/>
+            </a:pPr>
+            <a:r>
+              <a:rPr lang="en-US" sz="1900" dirty="0">
+                <a:solidFill>
+                  <a:srgbClr val="FF0000"/>
+                </a:solidFill>
+              </a:rPr>
+              <a:t>Above average lift, below average purchases:</a:t>
+            </a:r>
+          </a:p>
+          <a:p>
+            <a:pPr marL="0" indent="0">
+              <a:buNone/>
+            </a:pPr>
+            <a:r>
+              <a:rPr lang="en-US" sz="1900" dirty="0">
+                <a:solidFill>
+                  <a:srgbClr val="FF0000"/>
+                </a:solidFill>
+              </a:rPr>
+              <a:t>Despite increased traffic, these customers don’t seem to want your product, that’s bad!</a:t>
+            </a:r>
+          </a:p>
+        </p:txBody>
+      </p:sp>
       <p:pic>
         <p:nvPicPr>
-          <p:cNvPr id="7" name="Picture 6">
-            <a:extLst>
-              <a:ext uri="{FF2B5EF4-FFF2-40B4-BE49-F238E27FC236}">
-                <a16:creationId xmlns:a16="http://schemas.microsoft.com/office/drawing/2014/main" id="{200AF6D5-33E1-A54B-97B0-A59877B0A1F6}"/>
+          <p:cNvPr id="3" name="Picture 2">
+            <a:extLst>
+              <a:ext uri="{FF2B5EF4-FFF2-40B4-BE49-F238E27FC236}">
+                <a16:creationId xmlns:a16="http://schemas.microsoft.com/office/drawing/2014/main" id="{338EDB1B-3E18-D242-8603-2FD3D5D6AC74}"/>
               </a:ext>
             </a:extLst>
           </p:cNvPr>
@@ -5207,314 +5507,14 @@
         </p:blipFill>
         <p:spPr>
           <a:xfrm>
-            <a:off x="0" y="1352550"/>
-            <a:ext cx="8318500" cy="4152900"/>
+            <a:off x="0" y="1562421"/>
+            <a:ext cx="8394700" cy="4152900"/>
           </a:xfrm>
           <a:prstGeom prst="rect">
             <a:avLst/>
           </a:prstGeom>
         </p:spPr>
       </p:pic>
-      <p:sp>
-        <p:nvSpPr>
-          <p:cNvPr id="8" name="TextBox 7">
-            <a:extLst>
-              <a:ext uri="{FF2B5EF4-FFF2-40B4-BE49-F238E27FC236}">
-                <a16:creationId xmlns:a16="http://schemas.microsoft.com/office/drawing/2014/main" id="{C007679F-A092-FD40-A2A5-5E16866D5F92}"/>
-              </a:ext>
-            </a:extLst>
-          </p:cNvPr>
-          <p:cNvSpPr txBox="1"/>
-          <p:nvPr/>
-        </p:nvSpPr>
-        <p:spPr>
-          <a:xfrm>
-            <a:off x="0" y="6488668"/>
-            <a:ext cx="10105202" cy="369332"/>
-          </a:xfrm>
-          <a:prstGeom prst="rect">
-            <a:avLst/>
-          </a:prstGeom>
-          <a:noFill/>
-        </p:spPr>
-        <p:txBody>
-          <a:bodyPr wrap="none" rtlCol="0">
-            <a:spAutoFit/>
-          </a:bodyPr>
-          <a:lstStyle/>
-          <a:p>
-            <a:r>
-              <a:rPr lang="en-US" dirty="0"/>
-              <a:t>Note: the graph is divided into four quadrants, sectioned off by Average Lift (x) and Average Purchases (y)</a:t>
-            </a:r>
-          </a:p>
-        </p:txBody>
-      </p:sp>
-      <p:sp>
-        <p:nvSpPr>
-          <p:cNvPr id="9" name="Content Placeholder 2">
-            <a:extLst>
-              <a:ext uri="{FF2B5EF4-FFF2-40B4-BE49-F238E27FC236}">
-                <a16:creationId xmlns:a16="http://schemas.microsoft.com/office/drawing/2014/main" id="{EAC6F2EE-E8AF-4644-B28C-7A46F8948265}"/>
-              </a:ext>
-            </a:extLst>
-          </p:cNvPr>
-          <p:cNvSpPr txBox="1">
-            <a:spLocks/>
-          </p:cNvSpPr>
-          <p:nvPr/>
-        </p:nvSpPr>
-        <p:spPr>
-          <a:xfrm>
-            <a:off x="8318500" y="1562421"/>
-            <a:ext cx="3429438" cy="3733158"/>
-          </a:xfrm>
-          <a:prstGeom prst="rect">
-            <a:avLst/>
-          </a:prstGeom>
-        </p:spPr>
-        <p:txBody>
-          <a:bodyPr vert="horz" lIns="91440" tIns="45720" rIns="91440" bIns="45720" rtlCol="0">
-            <a:noAutofit/>
-          </a:bodyPr>
-          <a:lstStyle>
-            <a:lvl1pPr marL="228600" indent="-228600" algn="l" defTabSz="914400" rtl="0" eaLnBrk="1" latinLnBrk="0" hangingPunct="1">
-              <a:lnSpc>
-                <a:spcPct val="90000"/>
-              </a:lnSpc>
-              <a:spcBef>
-                <a:spcPts val="1000"/>
-              </a:spcBef>
-              <a:buFont typeface="Arial" panose="020B0604020202020204" pitchFamily="34" charset="0"/>
-              <a:buChar char="•"/>
-              <a:defRPr sz="2800" kern="1200">
-                <a:solidFill>
-                  <a:schemeClr val="tx1"/>
-                </a:solidFill>
-                <a:latin typeface="+mn-lt"/>
-                <a:ea typeface="+mn-ea"/>
-                <a:cs typeface="+mn-cs"/>
-              </a:defRPr>
-            </a:lvl1pPr>
-            <a:lvl2pPr marL="685800" indent="-228600" algn="l" defTabSz="914400" rtl="0" eaLnBrk="1" latinLnBrk="0" hangingPunct="1">
-              <a:lnSpc>
-                <a:spcPct val="90000"/>
-              </a:lnSpc>
-              <a:spcBef>
-                <a:spcPts val="500"/>
-              </a:spcBef>
-              <a:buFont typeface="Arial" panose="020B0604020202020204" pitchFamily="34" charset="0"/>
-              <a:buChar char="•"/>
-              <a:defRPr sz="2400" kern="1200">
-                <a:solidFill>
-                  <a:schemeClr val="tx1"/>
-                </a:solidFill>
-                <a:latin typeface="+mn-lt"/>
-                <a:ea typeface="+mn-ea"/>
-                <a:cs typeface="+mn-cs"/>
-              </a:defRPr>
-            </a:lvl2pPr>
-            <a:lvl3pPr marL="1143000" indent="-228600" algn="l" defTabSz="914400" rtl="0" eaLnBrk="1" latinLnBrk="0" hangingPunct="1">
-              <a:lnSpc>
-                <a:spcPct val="90000"/>
-              </a:lnSpc>
-              <a:spcBef>
-                <a:spcPts val="500"/>
-              </a:spcBef>
-              <a:buFont typeface="Arial" panose="020B0604020202020204" pitchFamily="34" charset="0"/>
-              <a:buChar char="•"/>
-              <a:defRPr sz="2000" kern="1200">
-                <a:solidFill>
-                  <a:schemeClr val="tx1"/>
-                </a:solidFill>
-                <a:latin typeface="+mn-lt"/>
-                <a:ea typeface="+mn-ea"/>
-                <a:cs typeface="+mn-cs"/>
-              </a:defRPr>
-            </a:lvl3pPr>
-            <a:lvl4pPr marL="1600200" indent="-228600" algn="l" defTabSz="914400" rtl="0" eaLnBrk="1" latinLnBrk="0" hangingPunct="1">
-              <a:lnSpc>
-                <a:spcPct val="90000"/>
-              </a:lnSpc>
-              <a:spcBef>
-                <a:spcPts val="500"/>
-              </a:spcBef>
-              <a:buFont typeface="Arial" panose="020B0604020202020204" pitchFamily="34" charset="0"/>
-              <a:buChar char="•"/>
-              <a:defRPr sz="1800" kern="1200">
-                <a:solidFill>
-                  <a:schemeClr val="tx1"/>
-                </a:solidFill>
-                <a:latin typeface="+mn-lt"/>
-                <a:ea typeface="+mn-ea"/>
-                <a:cs typeface="+mn-cs"/>
-              </a:defRPr>
-            </a:lvl4pPr>
-            <a:lvl5pPr marL="2057400" indent="-228600" algn="l" defTabSz="914400" rtl="0" eaLnBrk="1" latinLnBrk="0" hangingPunct="1">
-              <a:lnSpc>
-                <a:spcPct val="90000"/>
-              </a:lnSpc>
-              <a:spcBef>
-                <a:spcPts val="500"/>
-              </a:spcBef>
-              <a:buFont typeface="Arial" panose="020B0604020202020204" pitchFamily="34" charset="0"/>
-              <a:buChar char="•"/>
-              <a:defRPr sz="1800" kern="1200">
-                <a:solidFill>
-                  <a:schemeClr val="tx1"/>
-                </a:solidFill>
-                <a:latin typeface="+mn-lt"/>
-                <a:ea typeface="+mn-ea"/>
-                <a:cs typeface="+mn-cs"/>
-              </a:defRPr>
-            </a:lvl5pPr>
-            <a:lvl6pPr marL="2514600" indent="-228600" algn="l" defTabSz="914400" rtl="0" eaLnBrk="1" latinLnBrk="0" hangingPunct="1">
-              <a:lnSpc>
-                <a:spcPct val="90000"/>
-              </a:lnSpc>
-              <a:spcBef>
-                <a:spcPts val="500"/>
-              </a:spcBef>
-              <a:buFont typeface="Arial" panose="020B0604020202020204" pitchFamily="34" charset="0"/>
-              <a:buChar char="•"/>
-              <a:defRPr sz="1800" kern="1200">
-                <a:solidFill>
-                  <a:schemeClr val="tx1"/>
-                </a:solidFill>
-                <a:latin typeface="+mn-lt"/>
-                <a:ea typeface="+mn-ea"/>
-                <a:cs typeface="+mn-cs"/>
-              </a:defRPr>
-            </a:lvl6pPr>
-            <a:lvl7pPr marL="2971800" indent="-228600" algn="l" defTabSz="914400" rtl="0" eaLnBrk="1" latinLnBrk="0" hangingPunct="1">
-              <a:lnSpc>
-                <a:spcPct val="90000"/>
-              </a:lnSpc>
-              <a:spcBef>
-                <a:spcPts val="500"/>
-              </a:spcBef>
-              <a:buFont typeface="Arial" panose="020B0604020202020204" pitchFamily="34" charset="0"/>
-              <a:buChar char="•"/>
-              <a:defRPr sz="1800" kern="1200">
-                <a:solidFill>
-                  <a:schemeClr val="tx1"/>
-                </a:solidFill>
-                <a:latin typeface="+mn-lt"/>
-                <a:ea typeface="+mn-ea"/>
-                <a:cs typeface="+mn-cs"/>
-              </a:defRPr>
-            </a:lvl7pPr>
-            <a:lvl8pPr marL="3429000" indent="-228600" algn="l" defTabSz="914400" rtl="0" eaLnBrk="1" latinLnBrk="0" hangingPunct="1">
-              <a:lnSpc>
-                <a:spcPct val="90000"/>
-              </a:lnSpc>
-              <a:spcBef>
-                <a:spcPts val="500"/>
-              </a:spcBef>
-              <a:buFont typeface="Arial" panose="020B0604020202020204" pitchFamily="34" charset="0"/>
-              <a:buChar char="•"/>
-              <a:defRPr sz="1800" kern="1200">
-                <a:solidFill>
-                  <a:schemeClr val="tx1"/>
-                </a:solidFill>
-                <a:latin typeface="+mn-lt"/>
-                <a:ea typeface="+mn-ea"/>
-                <a:cs typeface="+mn-cs"/>
-              </a:defRPr>
-            </a:lvl8pPr>
-            <a:lvl9pPr marL="3886200" indent="-228600" algn="l" defTabSz="914400" rtl="0" eaLnBrk="1" latinLnBrk="0" hangingPunct="1">
-              <a:lnSpc>
-                <a:spcPct val="90000"/>
-              </a:lnSpc>
-              <a:spcBef>
-                <a:spcPts val="500"/>
-              </a:spcBef>
-              <a:buFont typeface="Arial" panose="020B0604020202020204" pitchFamily="34" charset="0"/>
-              <a:buChar char="•"/>
-              <a:defRPr sz="1800" kern="1200">
-                <a:solidFill>
-                  <a:schemeClr val="tx1"/>
-                </a:solidFill>
-                <a:latin typeface="+mn-lt"/>
-                <a:ea typeface="+mn-ea"/>
-                <a:cs typeface="+mn-cs"/>
-              </a:defRPr>
-            </a:lvl9pPr>
-          </a:lstStyle>
-          <a:p>
-            <a:pPr marL="0" indent="0">
-              <a:buNone/>
-            </a:pPr>
-            <a:r>
-              <a:rPr lang="en-US" sz="1900" dirty="0">
-                <a:solidFill>
-                  <a:srgbClr val="00B050"/>
-                </a:solidFill>
-              </a:rPr>
-              <a:t>Below average lift, yet above average purchases: </a:t>
-            </a:r>
-          </a:p>
-          <a:p>
-            <a:pPr marL="0" indent="0">
-              <a:buNone/>
-            </a:pPr>
-            <a:r>
-              <a:rPr lang="en-US" sz="1900" dirty="0">
-                <a:solidFill>
-                  <a:srgbClr val="00B050"/>
-                </a:solidFill>
-              </a:rPr>
-              <a:t>You’re getting less lift, but more purchases despite it, that’s good!</a:t>
-            </a:r>
-          </a:p>
-          <a:p>
-            <a:pPr marL="0" indent="0">
-              <a:buNone/>
-            </a:pPr>
-            <a:endParaRPr lang="en-US" sz="1900" dirty="0">
-              <a:solidFill>
-                <a:srgbClr val="FF0000"/>
-              </a:solidFill>
-            </a:endParaRPr>
-          </a:p>
-          <a:p>
-            <a:pPr marL="0" indent="0">
-              <a:buNone/>
-            </a:pPr>
-            <a:endParaRPr lang="en-US" sz="1900" dirty="0">
-              <a:solidFill>
-                <a:srgbClr val="FF0000"/>
-              </a:solidFill>
-            </a:endParaRPr>
-          </a:p>
-          <a:p>
-            <a:pPr marL="0" indent="0">
-              <a:buNone/>
-            </a:pPr>
-            <a:r>
-              <a:rPr lang="en-US" sz="1900" dirty="0">
-                <a:solidFill>
-                  <a:srgbClr val="FF0000"/>
-                </a:solidFill>
-              </a:rPr>
-              <a:t>Above average lift, below average purchases:</a:t>
-            </a:r>
-          </a:p>
-          <a:p>
-            <a:pPr marL="0" indent="0">
-              <a:buNone/>
-            </a:pPr>
-            <a:r>
-              <a:rPr lang="en-US" sz="1900" dirty="0">
-                <a:solidFill>
-                  <a:srgbClr val="FF0000"/>
-                </a:solidFill>
-              </a:rPr>
-              <a:t>Despite increased traffic, these customers don’t seem to want your product, that’s bad!</a:t>
-            </a:r>
-          </a:p>
-        </p:txBody>
-      </p:sp>
     </p:spTree>
     <p:extLst>
       <p:ext uri="{BB962C8B-B14F-4D97-AF65-F5344CB8AC3E}">
@@ -5892,10 +5892,10 @@
       </p:sp>
       <p:pic>
         <p:nvPicPr>
-          <p:cNvPr id="3" name="Picture 2">
-            <a:extLst>
-              <a:ext uri="{FF2B5EF4-FFF2-40B4-BE49-F238E27FC236}">
-                <a16:creationId xmlns:a16="http://schemas.microsoft.com/office/drawing/2014/main" id="{5DDD33F5-951E-2240-ACCE-CF2794F6B7D7}"/>
+          <p:cNvPr id="8" name="Picture 7">
+            <a:extLst>
+              <a:ext uri="{FF2B5EF4-FFF2-40B4-BE49-F238E27FC236}">
+                <a16:creationId xmlns:a16="http://schemas.microsoft.com/office/drawing/2014/main" id="{96C524E2-8ACC-814A-BDFD-CB3E96AA9562}"/>
               </a:ext>
             </a:extLst>
           </p:cNvPr>
@@ -5912,7 +5912,7 @@
         </p:blipFill>
         <p:spPr>
           <a:xfrm>
-            <a:off x="0" y="1352550"/>
+            <a:off x="0" y="1484914"/>
             <a:ext cx="8394700" cy="4152900"/>
           </a:xfrm>
           <a:prstGeom prst="rect">

</xml_diff>

<commit_message>
Finished updating barchart of channels that have no spend.  Removed yticklabels that weren't relevant, rounded mean_num_purchases_with_spend and mean_num_purchases_from_campaign to nearest whole number
</commit_message>
<xml_diff>
--- a/companyxyz_presentationNEW.pptx
+++ b/companyxyz_presentationNEW.pptx
@@ -7327,12 +7327,108 @@
           </a:p>
         </p:txBody>
       </p:sp>
+      <p:sp>
+        <p:nvSpPr>
+          <p:cNvPr id="12" name="TextBox 11">
+            <a:extLst>
+              <a:ext uri="{FF2B5EF4-FFF2-40B4-BE49-F238E27FC236}">
+                <a16:creationId xmlns:a16="http://schemas.microsoft.com/office/drawing/2014/main" id="{86F0F984-1787-1B4B-B950-A83B69091E23}"/>
+              </a:ext>
+            </a:extLst>
+          </p:cNvPr>
+          <p:cNvSpPr txBox="1"/>
+          <p:nvPr/>
+        </p:nvSpPr>
+        <p:spPr>
+          <a:xfrm>
+            <a:off x="8873067" y="1414562"/>
+            <a:ext cx="2480733" cy="4801314"/>
+          </a:xfrm>
+          <a:prstGeom prst="rect">
+            <a:avLst/>
+          </a:prstGeom>
+          <a:noFill/>
+        </p:spPr>
+        <p:txBody>
+          <a:bodyPr wrap="square" rtlCol="0">
+            <a:spAutoFit/>
+          </a:bodyPr>
+          <a:lstStyle/>
+          <a:p>
+            <a:r>
+              <a:rPr lang="en-US" dirty="0"/>
+              <a:t>Despite having no spending on advertising, </a:t>
+            </a:r>
+            <a:r>
+              <a:rPr lang="en-US" dirty="0">
+                <a:solidFill>
+                  <a:srgbClr val="00B050"/>
+                </a:solidFill>
+              </a:rPr>
+              <a:t>Fox News </a:t>
+            </a:r>
+            <a:r>
+              <a:rPr lang="en-US" dirty="0"/>
+              <a:t>was </a:t>
+            </a:r>
+            <a:r>
+              <a:rPr lang="en-US" i="1" dirty="0"/>
+              <a:t>way ahead </a:t>
+            </a:r>
+            <a:r>
+              <a:rPr lang="en-US" dirty="0"/>
+              <a:t>in terms of mean number of purchases, when considering only channels where money was spent on ads (19 channels).</a:t>
+            </a:r>
+          </a:p>
+          <a:p>
+            <a:endParaRPr lang="en-US" dirty="0"/>
+          </a:p>
+          <a:p>
+            <a:r>
+              <a:rPr lang="en-US" dirty="0"/>
+              <a:t>Other channels, like </a:t>
+            </a:r>
+            <a:r>
+              <a:rPr lang="en-US" dirty="0" err="1">
+                <a:solidFill>
+                  <a:srgbClr val="00B050"/>
+                </a:solidFill>
+              </a:rPr>
+              <a:t>Aapka</a:t>
+            </a:r>
+            <a:r>
+              <a:rPr lang="en-US" dirty="0">
+                <a:solidFill>
+                  <a:srgbClr val="00B050"/>
+                </a:solidFill>
+              </a:rPr>
+              <a:t> Colors </a:t>
+            </a:r>
+            <a:r>
+              <a:rPr lang="en-US" dirty="0"/>
+              <a:t>and </a:t>
+            </a:r>
+            <a:r>
+              <a:rPr lang="en-US" dirty="0">
+                <a:solidFill>
+                  <a:srgbClr val="00B050"/>
+                </a:solidFill>
+              </a:rPr>
+              <a:t>HGTV</a:t>
+            </a:r>
+            <a:r>
+              <a:rPr lang="en-US" dirty="0"/>
+              <a:t>, performed better than average, if we look average over any channel from the exit survey (30 channels).</a:t>
+            </a:r>
+          </a:p>
+        </p:txBody>
+      </p:sp>
       <p:pic>
         <p:nvPicPr>
-          <p:cNvPr id="11" name="Picture 10">
-            <a:extLst>
-              <a:ext uri="{FF2B5EF4-FFF2-40B4-BE49-F238E27FC236}">
-                <a16:creationId xmlns:a16="http://schemas.microsoft.com/office/drawing/2014/main" id="{853BB4F2-5CE2-E44B-A2D1-598A21752602}"/>
+          <p:cNvPr id="3" name="Picture 2">
+            <a:extLst>
+              <a:ext uri="{FF2B5EF4-FFF2-40B4-BE49-F238E27FC236}">
+                <a16:creationId xmlns:a16="http://schemas.microsoft.com/office/drawing/2014/main" id="{766F6AA1-B936-4F4F-8689-C198126E0393}"/>
               </a:ext>
             </a:extLst>
           </p:cNvPr>
@@ -7349,74 +7445,14 @@
         </p:blipFill>
         <p:spPr>
           <a:xfrm>
-            <a:off x="838200" y="1577975"/>
-            <a:ext cx="7632700" cy="4914900"/>
+            <a:off x="838200" y="1414562"/>
+            <a:ext cx="7048500" cy="4914900"/>
           </a:xfrm>
           <a:prstGeom prst="rect">
             <a:avLst/>
           </a:prstGeom>
         </p:spPr>
       </p:pic>
-      <p:sp>
-        <p:nvSpPr>
-          <p:cNvPr id="12" name="TextBox 11">
-            <a:extLst>
-              <a:ext uri="{FF2B5EF4-FFF2-40B4-BE49-F238E27FC236}">
-                <a16:creationId xmlns:a16="http://schemas.microsoft.com/office/drawing/2014/main" id="{86F0F984-1787-1B4B-B950-A83B69091E23}"/>
-              </a:ext>
-            </a:extLst>
-          </p:cNvPr>
-          <p:cNvSpPr txBox="1"/>
-          <p:nvPr/>
-        </p:nvSpPr>
-        <p:spPr>
-          <a:xfrm>
-            <a:off x="8873067" y="1414562"/>
-            <a:ext cx="2480733" cy="4801314"/>
-          </a:xfrm>
-          <a:prstGeom prst="rect">
-            <a:avLst/>
-          </a:prstGeom>
-          <a:noFill/>
-        </p:spPr>
-        <p:txBody>
-          <a:bodyPr wrap="square" rtlCol="0">
-            <a:spAutoFit/>
-          </a:bodyPr>
-          <a:lstStyle/>
-          <a:p>
-            <a:r>
-              <a:rPr lang="en-US" dirty="0"/>
-              <a:t>Despite having no spending on advertising, Fox News was </a:t>
-            </a:r>
-            <a:r>
-              <a:rPr lang="en-US" i="1" dirty="0"/>
-              <a:t>way ahead </a:t>
-            </a:r>
-            <a:r>
-              <a:rPr lang="en-US" dirty="0"/>
-              <a:t>in terms of mean number of purchases, when considering only channels where money was spent on ads (19 channels).</a:t>
-            </a:r>
-          </a:p>
-          <a:p>
-            <a:endParaRPr lang="en-US" dirty="0"/>
-          </a:p>
-          <a:p>
-            <a:r>
-              <a:rPr lang="en-US" dirty="0"/>
-              <a:t>Other channels, like </a:t>
-            </a:r>
-            <a:r>
-              <a:rPr lang="en-US" dirty="0" err="1"/>
-              <a:t>Aapka</a:t>
-            </a:r>
-            <a:r>
-              <a:rPr lang="en-US" dirty="0"/>
-              <a:t> Colors and HGTV, performed better than average, if we look average over any channel from the exit survey (30 channels).</a:t>
-            </a:r>
-          </a:p>
-        </p:txBody>
-      </p:sp>
     </p:spTree>
     <p:extLst>
       <p:ext uri="{BB962C8B-B14F-4D97-AF65-F5344CB8AC3E}">

</xml_diff>